<commit_message>
Add reasons for using KNN
</commit_message>
<xml_diff>
--- a/Nielsen_Random_State_42_Aadarsh_Singh.pptx
+++ b/Nielsen_Random_State_42_Aadarsh_Singh.pptx
@@ -5,7 +5,7 @@
     <p:sldMasterId id="2147483661" r:id="rId1"/>
   </p:sldMasterIdLst>
   <p:notesMasterIdLst>
-    <p:notesMasterId r:id="rId23"/>
+    <p:notesMasterId r:id="rId24"/>
   </p:notesMasterIdLst>
   <p:sldIdLst>
     <p:sldId id="256" r:id="rId2"/>
@@ -26,9 +26,10 @@
     <p:sldId id="262" r:id="rId17"/>
     <p:sldId id="278" r:id="rId18"/>
     <p:sldId id="274" r:id="rId19"/>
-    <p:sldId id="276" r:id="rId20"/>
-    <p:sldId id="277" r:id="rId21"/>
-    <p:sldId id="279" r:id="rId22"/>
+    <p:sldId id="280" r:id="rId20"/>
+    <p:sldId id="276" r:id="rId21"/>
+    <p:sldId id="277" r:id="rId22"/>
+    <p:sldId id="279" r:id="rId23"/>
   </p:sldIdLst>
   <p:sldSz cx="9144000" cy="5143500" type="screen16x9"/>
   <p:notesSz cx="6858000" cy="9144000"/>
@@ -2227,7 +2228,7 @@
     </p:spTree>
     <p:extLst>
       <p:ext uri="{BB962C8B-B14F-4D97-AF65-F5344CB8AC3E}">
-        <p14:creationId xmlns:p14="http://schemas.microsoft.com/office/powerpoint/2010/main" val="3253804217"/>
+        <p14:creationId xmlns:p14="http://schemas.microsoft.com/office/powerpoint/2010/main" val="1524265932"/>
       </p:ext>
     </p:extLst>
   </p:cSld>
@@ -2481,6 +2482,133 @@
     </p:spTree>
     <p:extLst>
       <p:ext uri="{BB962C8B-B14F-4D97-AF65-F5344CB8AC3E}">
+        <p14:creationId xmlns:p14="http://schemas.microsoft.com/office/powerpoint/2010/main" val="3253804217"/>
+      </p:ext>
+    </p:extLst>
+  </p:cSld>
+  <p:clrMapOvr>
+    <a:masterClrMapping/>
+  </p:clrMapOvr>
+</p:notes>
+</file>
+
+<file path=ppt/notesSlides/notesSlide21.xml><?xml version="1.0" encoding="utf-8"?>
+<p:notes xmlns:a="http://schemas.openxmlformats.org/drawingml/2006/main" xmlns:r="http://schemas.openxmlformats.org/officeDocument/2006/relationships" xmlns:p="http://schemas.openxmlformats.org/presentationml/2006/main" showMasterSp="0" showMasterPhAnim="0">
+  <p:cSld>
+    <p:spTree>
+      <p:nvGrpSpPr>
+        <p:cNvPr id="1" name="Shape 113"/>
+        <p:cNvGrpSpPr/>
+        <p:nvPr/>
+      </p:nvGrpSpPr>
+      <p:grpSpPr>
+        <a:xfrm>
+          <a:off x="0" y="0"/>
+          <a:ext cx="0" cy="0"/>
+          <a:chOff x="0" y="0"/>
+          <a:chExt cx="0" cy="0"/>
+        </a:xfrm>
+      </p:grpSpPr>
+      <p:sp>
+        <p:nvSpPr>
+          <p:cNvPr id="114" name="Google Shape;114;p5:notes"/>
+          <p:cNvSpPr>
+            <a:spLocks noGrp="1" noRot="1" noChangeAspect="1"/>
+          </p:cNvSpPr>
+          <p:nvPr>
+            <p:ph type="sldImg" idx="2"/>
+          </p:nvPr>
+        </p:nvSpPr>
+        <p:spPr>
+          <a:xfrm>
+            <a:off x="381000" y="685800"/>
+            <a:ext cx="6096000" cy="3429000"/>
+          </a:xfrm>
+          <a:custGeom>
+            <a:avLst/>
+            <a:gdLst/>
+            <a:ahLst/>
+            <a:cxnLst/>
+            <a:rect l="l" t="t" r="r" b="b"/>
+            <a:pathLst>
+              <a:path w="120000" h="120000" extrusionOk="0">
+                <a:moveTo>
+                  <a:pt x="0" y="0"/>
+                </a:moveTo>
+                <a:lnTo>
+                  <a:pt x="120000" y="0"/>
+                </a:lnTo>
+                <a:lnTo>
+                  <a:pt x="120000" y="120000"/>
+                </a:lnTo>
+                <a:lnTo>
+                  <a:pt x="0" y="120000"/>
+                </a:lnTo>
+                <a:close/>
+              </a:path>
+            </a:pathLst>
+          </a:custGeom>
+          <a:noFill/>
+          <a:ln w="9525" cap="flat" cmpd="sng">
+            <a:solidFill>
+              <a:srgbClr val="000000"/>
+            </a:solidFill>
+            <a:prstDash val="solid"/>
+            <a:round/>
+            <a:headEnd type="none" w="sm" len="sm"/>
+            <a:tailEnd type="none" w="sm" len="sm"/>
+          </a:ln>
+        </p:spPr>
+      </p:sp>
+      <p:sp>
+        <p:nvSpPr>
+          <p:cNvPr id="115" name="Google Shape;115;p5:notes"/>
+          <p:cNvSpPr txBox="1">
+            <a:spLocks noGrp="1"/>
+          </p:cNvSpPr>
+          <p:nvPr>
+            <p:ph type="body" idx="1"/>
+          </p:nvPr>
+        </p:nvSpPr>
+        <p:spPr>
+          <a:xfrm>
+            <a:off x="685800" y="4343400"/>
+            <a:ext cx="5486400" cy="4114800"/>
+          </a:xfrm>
+          <a:prstGeom prst="rect">
+            <a:avLst/>
+          </a:prstGeom>
+          <a:noFill/>
+          <a:ln>
+            <a:noFill/>
+          </a:ln>
+        </p:spPr>
+        <p:txBody>
+          <a:bodyPr spcFirstLastPara="1" wrap="square" lIns="91425" tIns="91425" rIns="91425" bIns="91425" anchor="t" anchorCtr="0">
+            <a:noAutofit/>
+          </a:bodyPr>
+          <a:lstStyle/>
+          <a:p>
+            <a:pPr marL="0" lvl="0" indent="0" algn="l" rtl="0">
+              <a:lnSpc>
+                <a:spcPct val="100000"/>
+              </a:lnSpc>
+              <a:spcBef>
+                <a:spcPts val="0"/>
+              </a:spcBef>
+              <a:spcAft>
+                <a:spcPts val="0"/>
+              </a:spcAft>
+              <a:buSzPts val="1100"/>
+              <a:buNone/>
+            </a:pPr>
+            <a:endParaRPr/>
+          </a:p>
+        </p:txBody>
+      </p:sp>
+    </p:spTree>
+    <p:extLst>
+      <p:ext uri="{BB962C8B-B14F-4D97-AF65-F5344CB8AC3E}">
         <p14:creationId xmlns:p14="http://schemas.microsoft.com/office/powerpoint/2010/main" val="3902659928"/>
       </p:ext>
     </p:extLst>
@@ -2491,7 +2619,7 @@
 </p:notes>
 </file>
 
-<file path=ppt/notesSlides/notesSlide21.xml><?xml version="1.0" encoding="utf-8"?>
+<file path=ppt/notesSlides/notesSlide22.xml><?xml version="1.0" encoding="utf-8"?>
 <p:notes xmlns:a="http://schemas.openxmlformats.org/drawingml/2006/main" xmlns:r="http://schemas.openxmlformats.org/officeDocument/2006/relationships" xmlns:p="http://schemas.openxmlformats.org/presentationml/2006/main" showMasterSp="0" showMasterPhAnim="0">
   <p:cSld>
     <p:spTree>
@@ -20191,6 +20319,418 @@
             </a:pPr>
             <a:r>
               <a:rPr lang="en-US" dirty="0"/>
+              <a:t>Why KNN?</a:t>
+            </a:r>
+            <a:endParaRPr dirty="0"/>
+          </a:p>
+        </p:txBody>
+      </p:sp>
+      <p:pic>
+        <p:nvPicPr>
+          <p:cNvPr id="118" name="Google Shape;118;p19"/>
+          <p:cNvPicPr preferRelativeResize="0"/>
+          <p:nvPr/>
+        </p:nvPicPr>
+        <p:blipFill rotWithShape="1">
+          <a:blip r:embed="rId3">
+            <a:alphaModFix/>
+          </a:blip>
+          <a:srcRect/>
+          <a:stretch/>
+        </p:blipFill>
+        <p:spPr>
+          <a:xfrm>
+            <a:off x="3525697" y="4517224"/>
+            <a:ext cx="2019582" cy="485843"/>
+          </a:xfrm>
+          <a:prstGeom prst="rect">
+            <a:avLst/>
+          </a:prstGeom>
+          <a:noFill/>
+          <a:ln>
+            <a:noFill/>
+          </a:ln>
+        </p:spPr>
+      </p:pic>
+      <p:sp>
+        <p:nvSpPr>
+          <p:cNvPr id="2" name="TextBox 1">
+            <a:extLst>
+              <a:ext uri="{FF2B5EF4-FFF2-40B4-BE49-F238E27FC236}">
+                <a16:creationId xmlns:a16="http://schemas.microsoft.com/office/drawing/2014/main" id="{6D941687-561C-4B46-83BC-B91DD9C46A75}"/>
+              </a:ext>
+            </a:extLst>
+          </p:cNvPr>
+          <p:cNvSpPr txBox="1"/>
+          <p:nvPr/>
+        </p:nvSpPr>
+        <p:spPr>
+          <a:xfrm>
+            <a:off x="348875" y="1043344"/>
+            <a:ext cx="8387079" cy="2677656"/>
+          </a:xfrm>
+          <a:prstGeom prst="rect">
+            <a:avLst/>
+          </a:prstGeom>
+          <a:noFill/>
+        </p:spPr>
+        <p:txBody>
+          <a:bodyPr wrap="square" rtlCol="0">
+            <a:spAutoFit/>
+          </a:bodyPr>
+          <a:lstStyle>
+            <a:defPPr marR="0" lvl="0" algn="l" rtl="0">
+              <a:lnSpc>
+                <a:spcPct val="100000"/>
+              </a:lnSpc>
+              <a:spcBef>
+                <a:spcPts val="0"/>
+              </a:spcBef>
+              <a:spcAft>
+                <a:spcPts val="0"/>
+              </a:spcAft>
+            </a:defPPr>
+            <a:lvl1pPr marL="285750" indent="-285750">
+              <a:buFont typeface="Arial" panose="020B0604020202020204" pitchFamily="34" charset="0"/>
+              <a:buChar char="•"/>
+              <a:defRPr i="1">
+                <a:latin typeface="Cambria Math" panose="02040503050406030204" pitchFamily="18" charset="0"/>
+              </a:defRPr>
+            </a:lvl1pPr>
+          </a:lstStyle>
+          <a:p>
+            <a:r>
+              <a:rPr lang="en-US" sz="2100" i="0" dirty="0">
+                <a:latin typeface="Calibri"/>
+                <a:cs typeface="Calibri"/>
+                <a:sym typeface="Calibri"/>
+              </a:rPr>
+              <a:t>Can predict both discrete and continuous attributes</a:t>
+            </a:r>
+          </a:p>
+          <a:p>
+            <a:r>
+              <a:rPr lang="en-US" sz="2100" i="0" dirty="0">
+                <a:latin typeface="Calibri"/>
+                <a:cs typeface="Calibri"/>
+                <a:sym typeface="Calibri"/>
+              </a:rPr>
+              <a:t>Lazy, so no necessity for creating predictive model for each attribute</a:t>
+            </a:r>
+          </a:p>
+          <a:p>
+            <a:r>
+              <a:rPr lang="en-US" sz="2100" i="0" dirty="0">
+                <a:latin typeface="Calibri"/>
+                <a:cs typeface="Calibri"/>
+                <a:sym typeface="Calibri"/>
+              </a:rPr>
+              <a:t>Can be easily adapted to work with any attribute by just modifying which attributes will be considered in distance metrics.</a:t>
+            </a:r>
+          </a:p>
+          <a:p>
+            <a:r>
+              <a:rPr lang="en-US" sz="2100" i="0" dirty="0">
+                <a:latin typeface="Calibri"/>
+                <a:cs typeface="Calibri"/>
+                <a:sym typeface="Calibri"/>
+              </a:rPr>
+              <a:t>Can easily treat examples with multiple missing values.</a:t>
+            </a:r>
+          </a:p>
+          <a:p>
+            <a:endParaRPr lang="en-US" sz="2100" i="0" dirty="0">
+              <a:latin typeface="Calibri"/>
+              <a:cs typeface="Calibri"/>
+              <a:sym typeface="Calibri"/>
+            </a:endParaRPr>
+          </a:p>
+          <a:p>
+            <a:endParaRPr lang="en-US" sz="2100" i="0" dirty="0">
+              <a:latin typeface="Calibri"/>
+              <a:cs typeface="Calibri"/>
+              <a:sym typeface="Calibri"/>
+            </a:endParaRPr>
+          </a:p>
+          <a:p>
+            <a:pPr marL="0" indent="0">
+              <a:buNone/>
+            </a:pPr>
+            <a:r>
+              <a:rPr lang="en-US" sz="2100" i="0" dirty="0">
+                <a:latin typeface="Calibri"/>
+                <a:cs typeface="Calibri"/>
+                <a:sym typeface="Calibri"/>
+              </a:rPr>
+              <a:t>Reference - </a:t>
+            </a:r>
+            <a:r>
+              <a:rPr lang="en-US" sz="2000" i="0" dirty="0">
+                <a:latin typeface="Calibri"/>
+                <a:cs typeface="Calibri"/>
+                <a:sym typeface="Calibri"/>
+                <a:hlinkClick r:id="rId4"/>
+              </a:rPr>
+              <a:t>A Study of K-Nearest </a:t>
+            </a:r>
+            <a:r>
+              <a:rPr lang="en-US" sz="2000" i="0" dirty="0" err="1">
+                <a:latin typeface="Calibri"/>
+                <a:cs typeface="Calibri"/>
+                <a:sym typeface="Calibri"/>
+                <a:hlinkClick r:id="rId4"/>
+              </a:rPr>
+              <a:t>Neighbour</a:t>
+            </a:r>
+            <a:r>
+              <a:rPr lang="en-US" sz="2000" i="0" dirty="0">
+                <a:latin typeface="Calibri"/>
+                <a:cs typeface="Calibri"/>
+                <a:sym typeface="Calibri"/>
+                <a:hlinkClick r:id="rId4"/>
+              </a:rPr>
+              <a:t> as an Imputation Method</a:t>
+            </a:r>
+            <a:endParaRPr lang="en-US" sz="2000" i="0" dirty="0">
+              <a:latin typeface="Calibri"/>
+              <a:cs typeface="Calibri"/>
+              <a:sym typeface="Calibri"/>
+            </a:endParaRPr>
+          </a:p>
+        </p:txBody>
+      </p:sp>
+    </p:spTree>
+    <p:extLst>
+      <p:ext uri="{BB962C8B-B14F-4D97-AF65-F5344CB8AC3E}">
+        <p14:creationId xmlns:p14="http://schemas.microsoft.com/office/powerpoint/2010/main" val="3795392009"/>
+      </p:ext>
+    </p:extLst>
+  </p:cSld>
+  <p:clrMapOvr>
+    <a:masterClrMapping/>
+  </p:clrMapOvr>
+</p:sld>
+</file>
+
+<file path=ppt/slides/slide2.xml><?xml version="1.0" encoding="utf-8"?>
+<p:sld xmlns:a="http://schemas.openxmlformats.org/drawingml/2006/main" xmlns:r="http://schemas.openxmlformats.org/officeDocument/2006/relationships" xmlns:p="http://schemas.openxmlformats.org/presentationml/2006/main">
+  <p:cSld>
+    <p:spTree>
+      <p:nvGrpSpPr>
+        <p:cNvPr id="1" name="Shape 96"/>
+        <p:cNvGrpSpPr/>
+        <p:nvPr/>
+      </p:nvGrpSpPr>
+      <p:grpSpPr>
+        <a:xfrm>
+          <a:off x="0" y="0"/>
+          <a:ext cx="0" cy="0"/>
+          <a:chOff x="0" y="0"/>
+          <a:chExt cx="0" cy="0"/>
+        </a:xfrm>
+      </p:grpSpPr>
+      <p:sp>
+        <p:nvSpPr>
+          <p:cNvPr id="97" name="Google Shape;97;p16"/>
+          <p:cNvSpPr txBox="1">
+            <a:spLocks noGrp="1"/>
+          </p:cNvSpPr>
+          <p:nvPr>
+            <p:ph type="title"/>
+          </p:nvPr>
+        </p:nvSpPr>
+        <p:spPr>
+          <a:xfrm>
+            <a:off x="490250" y="450150"/>
+            <a:ext cx="6367800" cy="4090800"/>
+          </a:xfrm>
+          <a:prstGeom prst="rect">
+            <a:avLst/>
+          </a:prstGeom>
+          <a:noFill/>
+          <a:ln>
+            <a:noFill/>
+          </a:ln>
+        </p:spPr>
+        <p:txBody>
+          <a:bodyPr spcFirstLastPara="1" wrap="square" lIns="91425" tIns="91425" rIns="91425" bIns="91425" anchor="ctr" anchorCtr="0">
+            <a:noAutofit/>
+          </a:bodyPr>
+          <a:lstStyle/>
+          <a:p>
+            <a:pPr lvl="0"/>
+            <a:r>
+              <a:rPr lang="en" sz="2400" b="1" dirty="0"/>
+              <a:t>Team Name: </a:t>
+            </a:r>
+            <a:r>
+              <a:rPr lang="en-US" sz="2400" dirty="0"/>
+              <a:t>Random_State_42</a:t>
+            </a:r>
+            <a:r>
+              <a:rPr lang="en" sz="3200" dirty="0"/>
+              <a:t> </a:t>
+            </a:r>
+            <a:endParaRPr sz="2400" dirty="0"/>
+          </a:p>
+          <a:p>
+            <a:pPr marL="0" lvl="0" indent="0" algn="l" rtl="0">
+              <a:lnSpc>
+                <a:spcPct val="90000"/>
+              </a:lnSpc>
+              <a:spcBef>
+                <a:spcPts val="0"/>
+              </a:spcBef>
+              <a:spcAft>
+                <a:spcPts val="0"/>
+              </a:spcAft>
+              <a:buClr>
+                <a:schemeClr val="dk1"/>
+              </a:buClr>
+              <a:buSzPts val="4800"/>
+              <a:buFont typeface="Calibri"/>
+              <a:buNone/>
+            </a:pPr>
+            <a:r>
+              <a:rPr lang="en" sz="2400" b="1" dirty="0"/>
+              <a:t>No of team members: </a:t>
+            </a:r>
+            <a:r>
+              <a:rPr lang="en" sz="2400" dirty="0"/>
+              <a:t>1</a:t>
+            </a:r>
+            <a:endParaRPr sz="2400" dirty="0"/>
+          </a:p>
+          <a:p>
+            <a:pPr marL="0" lvl="0" indent="0" algn="l" rtl="0">
+              <a:lnSpc>
+                <a:spcPct val="90000"/>
+              </a:lnSpc>
+              <a:spcBef>
+                <a:spcPts val="0"/>
+              </a:spcBef>
+              <a:spcAft>
+                <a:spcPts val="0"/>
+              </a:spcAft>
+              <a:buClr>
+                <a:schemeClr val="dk1"/>
+              </a:buClr>
+              <a:buSzPts val="4800"/>
+              <a:buFont typeface="Calibri"/>
+              <a:buNone/>
+            </a:pPr>
+            <a:r>
+              <a:rPr lang="en" sz="2400" b="1" dirty="0"/>
+              <a:t>Team Members: </a:t>
+            </a:r>
+            <a:r>
+              <a:rPr lang="en-US" sz="2400" dirty="0"/>
+              <a:t>Aadarsh Singh</a:t>
+            </a:r>
+            <a:endParaRPr sz="2400" dirty="0"/>
+          </a:p>
+        </p:txBody>
+      </p:sp>
+      <p:pic>
+        <p:nvPicPr>
+          <p:cNvPr id="98" name="Google Shape;98;p16"/>
+          <p:cNvPicPr preferRelativeResize="0"/>
+          <p:nvPr/>
+        </p:nvPicPr>
+        <p:blipFill rotWithShape="1">
+          <a:blip r:embed="rId3">
+            <a:alphaModFix/>
+          </a:blip>
+          <a:srcRect/>
+          <a:stretch/>
+        </p:blipFill>
+        <p:spPr>
+          <a:xfrm>
+            <a:off x="3525697" y="4517224"/>
+            <a:ext cx="2019582" cy="485843"/>
+          </a:xfrm>
+          <a:prstGeom prst="rect">
+            <a:avLst/>
+          </a:prstGeom>
+          <a:noFill/>
+          <a:ln>
+            <a:noFill/>
+          </a:ln>
+        </p:spPr>
+      </p:pic>
+    </p:spTree>
+  </p:cSld>
+  <p:clrMapOvr>
+    <a:masterClrMapping/>
+  </p:clrMapOvr>
+</p:sld>
+</file>
+
+<file path=ppt/slides/slide20.xml><?xml version="1.0" encoding="utf-8"?>
+<p:sld xmlns:a="http://schemas.openxmlformats.org/drawingml/2006/main" xmlns:r="http://schemas.openxmlformats.org/officeDocument/2006/relationships" xmlns:p="http://schemas.openxmlformats.org/presentationml/2006/main">
+  <p:cSld>
+    <p:spTree>
+      <p:nvGrpSpPr>
+        <p:cNvPr id="1" name="Shape 116"/>
+        <p:cNvGrpSpPr/>
+        <p:nvPr/>
+      </p:nvGrpSpPr>
+      <p:grpSpPr>
+        <a:xfrm>
+          <a:off x="0" y="0"/>
+          <a:ext cx="0" cy="0"/>
+          <a:chOff x="0" y="0"/>
+          <a:chExt cx="0" cy="0"/>
+        </a:xfrm>
+      </p:grpSpPr>
+      <p:sp>
+        <p:nvSpPr>
+          <p:cNvPr id="117" name="Google Shape;117;p19"/>
+          <p:cNvSpPr txBox="1">
+            <a:spLocks noGrp="1"/>
+          </p:cNvSpPr>
+          <p:nvPr>
+            <p:ph type="title"/>
+          </p:nvPr>
+        </p:nvSpPr>
+        <p:spPr>
+          <a:xfrm>
+            <a:off x="275188" y="252583"/>
+            <a:ext cx="8520600" cy="572700"/>
+          </a:xfrm>
+          <a:prstGeom prst="rect">
+            <a:avLst/>
+          </a:prstGeom>
+          <a:noFill/>
+          <a:ln>
+            <a:noFill/>
+          </a:ln>
+        </p:spPr>
+        <p:txBody>
+          <a:bodyPr spcFirstLastPara="1" wrap="square" lIns="91425" tIns="91425" rIns="91425" bIns="91425" anchor="t" anchorCtr="0">
+            <a:noAutofit/>
+          </a:bodyPr>
+          <a:lstStyle/>
+          <a:p>
+            <a:pPr marL="0" lvl="0" indent="0" algn="l" rtl="0">
+              <a:lnSpc>
+                <a:spcPct val="90000"/>
+              </a:lnSpc>
+              <a:spcBef>
+                <a:spcPts val="0"/>
+              </a:spcBef>
+              <a:spcAft>
+                <a:spcPts val="0"/>
+              </a:spcAft>
+              <a:buClr>
+                <a:schemeClr val="dk1"/>
+              </a:buClr>
+              <a:buSzPts val="2800"/>
+              <a:buFont typeface="Calibri"/>
+              <a:buNone/>
+            </a:pPr>
+            <a:r>
+              <a:rPr lang="en-US" dirty="0"/>
               <a:t>Details of the KNN algorithm used</a:t>
             </a:r>
             <a:endParaRPr dirty="0"/>
@@ -20466,161 +21006,7 @@
 </p:sld>
 </file>
 
-<file path=ppt/slides/slide2.xml><?xml version="1.0" encoding="utf-8"?>
-<p:sld xmlns:a="http://schemas.openxmlformats.org/drawingml/2006/main" xmlns:r="http://schemas.openxmlformats.org/officeDocument/2006/relationships" xmlns:p="http://schemas.openxmlformats.org/presentationml/2006/main">
-  <p:cSld>
-    <p:spTree>
-      <p:nvGrpSpPr>
-        <p:cNvPr id="1" name="Shape 96"/>
-        <p:cNvGrpSpPr/>
-        <p:nvPr/>
-      </p:nvGrpSpPr>
-      <p:grpSpPr>
-        <a:xfrm>
-          <a:off x="0" y="0"/>
-          <a:ext cx="0" cy="0"/>
-          <a:chOff x="0" y="0"/>
-          <a:chExt cx="0" cy="0"/>
-        </a:xfrm>
-      </p:grpSpPr>
-      <p:sp>
-        <p:nvSpPr>
-          <p:cNvPr id="97" name="Google Shape;97;p16"/>
-          <p:cNvSpPr txBox="1">
-            <a:spLocks noGrp="1"/>
-          </p:cNvSpPr>
-          <p:nvPr>
-            <p:ph type="title"/>
-          </p:nvPr>
-        </p:nvSpPr>
-        <p:spPr>
-          <a:xfrm>
-            <a:off x="490250" y="450150"/>
-            <a:ext cx="6367800" cy="4090800"/>
-          </a:xfrm>
-          <a:prstGeom prst="rect">
-            <a:avLst/>
-          </a:prstGeom>
-          <a:noFill/>
-          <a:ln>
-            <a:noFill/>
-          </a:ln>
-        </p:spPr>
-        <p:txBody>
-          <a:bodyPr spcFirstLastPara="1" wrap="square" lIns="91425" tIns="91425" rIns="91425" bIns="91425" anchor="ctr" anchorCtr="0">
-            <a:noAutofit/>
-          </a:bodyPr>
-          <a:lstStyle/>
-          <a:p>
-            <a:pPr lvl="0"/>
-            <a:r>
-              <a:rPr lang="en" sz="2400" b="1" dirty="0"/>
-              <a:t>Team Name: </a:t>
-            </a:r>
-            <a:r>
-              <a:rPr lang="en-US" sz="2400" dirty="0"/>
-              <a:t>Random_State_42</a:t>
-            </a:r>
-            <a:r>
-              <a:rPr lang="en" sz="3200" dirty="0"/>
-              <a:t> </a:t>
-            </a:r>
-            <a:endParaRPr sz="2400" dirty="0"/>
-          </a:p>
-          <a:p>
-            <a:pPr marL="0" lvl="0" indent="0" algn="l" rtl="0">
-              <a:lnSpc>
-                <a:spcPct val="90000"/>
-              </a:lnSpc>
-              <a:spcBef>
-                <a:spcPts val="0"/>
-              </a:spcBef>
-              <a:spcAft>
-                <a:spcPts val="0"/>
-              </a:spcAft>
-              <a:buClr>
-                <a:schemeClr val="dk1"/>
-              </a:buClr>
-              <a:buSzPts val="4800"/>
-              <a:buFont typeface="Calibri"/>
-              <a:buNone/>
-            </a:pPr>
-            <a:r>
-              <a:rPr lang="en" sz="2400" b="1" dirty="0"/>
-              <a:t>No of team members: </a:t>
-            </a:r>
-            <a:r>
-              <a:rPr lang="en" sz="2400" dirty="0"/>
-              <a:t>1</a:t>
-            </a:r>
-            <a:endParaRPr sz="2400" dirty="0"/>
-          </a:p>
-          <a:p>
-            <a:pPr marL="0" lvl="0" indent="0" algn="l" rtl="0">
-              <a:lnSpc>
-                <a:spcPct val="90000"/>
-              </a:lnSpc>
-              <a:spcBef>
-                <a:spcPts val="0"/>
-              </a:spcBef>
-              <a:spcAft>
-                <a:spcPts val="0"/>
-              </a:spcAft>
-              <a:buClr>
-                <a:schemeClr val="dk1"/>
-              </a:buClr>
-              <a:buSzPts val="4800"/>
-              <a:buFont typeface="Calibri"/>
-              <a:buNone/>
-            </a:pPr>
-            <a:r>
-              <a:rPr lang="en" sz="2400" b="1" dirty="0"/>
-              <a:t>Team Members: </a:t>
-            </a:r>
-            <a:r>
-              <a:rPr lang="en-US" sz="2400" dirty="0"/>
-              <a:t>Aadarsh Singh</a:t>
-            </a:r>
-            <a:endParaRPr sz="2400" dirty="0"/>
-          </a:p>
-        </p:txBody>
-      </p:sp>
-      <p:pic>
-        <p:nvPicPr>
-          <p:cNvPr id="98" name="Google Shape;98;p16"/>
-          <p:cNvPicPr preferRelativeResize="0"/>
-          <p:nvPr/>
-        </p:nvPicPr>
-        <p:blipFill rotWithShape="1">
-          <a:blip r:embed="rId3">
-            <a:alphaModFix/>
-          </a:blip>
-          <a:srcRect/>
-          <a:stretch/>
-        </p:blipFill>
-        <p:spPr>
-          <a:xfrm>
-            <a:off x="3525697" y="4517224"/>
-            <a:ext cx="2019582" cy="485843"/>
-          </a:xfrm>
-          <a:prstGeom prst="rect">
-            <a:avLst/>
-          </a:prstGeom>
-          <a:noFill/>
-          <a:ln>
-            <a:noFill/>
-          </a:ln>
-        </p:spPr>
-      </p:pic>
-    </p:spTree>
-  </p:cSld>
-  <p:clrMapOvr>
-    <a:masterClrMapping/>
-  </p:clrMapOvr>
-</p:sld>
-</file>
-
-<file path=ppt/slides/slide20.xml><?xml version="1.0" encoding="utf-8"?>
+<file path=ppt/slides/slide21.xml><?xml version="1.0" encoding="utf-8"?>
 <p:sld xmlns:a="http://schemas.openxmlformats.org/drawingml/2006/main" xmlns:r="http://schemas.openxmlformats.org/officeDocument/2006/relationships" xmlns:p="http://schemas.openxmlformats.org/presentationml/2006/main">
   <p:cSld>
     <p:spTree>
@@ -21176,7 +21562,7 @@
 </p:sld>
 </file>
 
-<file path=ppt/slides/slide21.xml><?xml version="1.0" encoding="utf-8"?>
+<file path=ppt/slides/slide22.xml><?xml version="1.0" encoding="utf-8"?>
 <p:sld xmlns:a="http://schemas.openxmlformats.org/drawingml/2006/main" xmlns:r="http://schemas.openxmlformats.org/officeDocument/2006/relationships" xmlns:p="http://schemas.openxmlformats.org/presentationml/2006/main">
   <p:cSld>
     <p:spTree>

</xml_diff>